<commit_message>
Updated with bit.ly address.
</commit_message>
<xml_diff>
--- a/Mobile DeveloperDays 2015 - Ionic Framework.pptx
+++ b/Mobile DeveloperDays 2015 - Ionic Framework.pptx
@@ -5053,18 +5053,34 @@
           <a:lstStyle/>
           <a:p>
             <a:r>
-              <a:rPr lang="en-GB" dirty="0">
+              <a:rPr lang="pl-PL" dirty="0"/>
+              <a:t>Prezentacja i kod źródłowy: </a:t>
+            </a:r>
+            <a:r>
+              <a:rPr lang="pl-PL" dirty="0">
                 <a:hlinkClick r:id="rId2"/>
               </a:rPr>
-              <a:t>http://ionicframework.com</a:t>
-            </a:r>
-            <a:r>
-              <a:rPr lang="en-GB" dirty="0" smtClean="0">
+              <a:t>http://</a:t>
+            </a:r>
+            <a:r>
+              <a:rPr lang="pl-PL" dirty="0" smtClean="0">
                 <a:hlinkClick r:id="rId2"/>
               </a:rPr>
-              <a:t>/</a:t>
-            </a:r>
-            <a:endParaRPr lang="pl-PL" dirty="0" smtClean="0"/>
+              <a:t>bit.ly/mdd2015-ionic</a:t>
+            </a:r>
+            <a:endParaRPr lang="pl-PL" dirty="0" smtClean="0">
+              <a:hlinkClick r:id="rId3"/>
+            </a:endParaRPr>
+          </a:p>
+          <a:p>
+            <a:endParaRPr lang="pl-PL" dirty="0">
+              <a:hlinkClick r:id="rId3"/>
+            </a:endParaRPr>
+          </a:p>
+          <a:p>
+            <a:endParaRPr lang="pl-PL" dirty="0" smtClean="0">
+              <a:hlinkClick r:id="rId3"/>
+            </a:endParaRPr>
           </a:p>
           <a:p>
             <a:r>
@@ -5077,7 +5093,7 @@
               <a:rPr lang="en-GB" dirty="0">
                 <a:hlinkClick r:id="rId3"/>
               </a:rPr>
-              <a:t>://cordova.apache.org</a:t>
+              <a:t>://ionicframework.com</a:t>
             </a:r>
             <a:r>
               <a:rPr lang="en-GB" dirty="0" smtClean="0">
@@ -5098,7 +5114,7 @@
               <a:rPr lang="en-GB" dirty="0">
                 <a:hlinkClick r:id="rId4"/>
               </a:rPr>
-              <a:t>://ngcordova.com</a:t>
+              <a:t>://cordova.apache.org</a:t>
             </a:r>
             <a:r>
               <a:rPr lang="en-GB" dirty="0" smtClean="0">
@@ -5119,7 +5135,7 @@
               <a:rPr lang="en-GB" dirty="0">
                 <a:hlinkClick r:id="rId5"/>
               </a:rPr>
-              <a:t>://ionicons.com</a:t>
+              <a:t>://ngcordova.com</a:t>
             </a:r>
             <a:r>
               <a:rPr lang="en-GB" dirty="0" smtClean="0">
@@ -5140,24 +5156,42 @@
               <a:rPr lang="en-GB" dirty="0">
                 <a:hlinkClick r:id="rId6"/>
               </a:rPr>
-              <a:t>://</a:t>
+              <a:t>://ionicons.com</a:t>
             </a:r>
             <a:r>
               <a:rPr lang="en-GB" dirty="0" smtClean="0">
                 <a:hlinkClick r:id="rId6"/>
               </a:rPr>
+              <a:t>/</a:t>
+            </a:r>
+            <a:endParaRPr lang="pl-PL" dirty="0" smtClean="0"/>
+          </a:p>
+          <a:p>
+            <a:r>
+              <a:rPr lang="en-GB" dirty="0" smtClean="0">
+                <a:hlinkClick r:id="rId7"/>
+              </a:rPr>
+              <a:t>http</a:t>
+            </a:r>
+            <a:r>
+              <a:rPr lang="en-GB" dirty="0">
+                <a:hlinkClick r:id="rId7"/>
+              </a:rPr>
+              <a:t>://</a:t>
+            </a:r>
+            <a:r>
+              <a:rPr lang="en-GB" dirty="0" smtClean="0">
+                <a:hlinkClick r:id="rId7"/>
+              </a:rPr>
               <a:t>www.pluralsight.com/courses/building-mobile-apps-ionic-framework-angularjs</a:t>
             </a:r>
             <a:endParaRPr lang="pl-PL" dirty="0" smtClean="0"/>
           </a:p>
           <a:p>
-            <a:endParaRPr lang="pl-PL" dirty="0"/>
-          </a:p>
-          <a:p>
-            <a:r>
-              <a:rPr lang="pl-PL" dirty="0" smtClean="0"/>
-              <a:t>Prezentacja i kod źródłowy: </a:t>
-            </a:r>
+            <a:pPr marL="0" indent="0">
+              <a:buNone/>
+            </a:pPr>
+            <a:endParaRPr lang="pl-PL" dirty="0" smtClean="0"/>
           </a:p>
         </p:txBody>
       </p:sp>

</xml_diff>